<commit_message>
Updates to RMD and knitted copy added
</commit_message>
<xml_diff>
--- a/Google_Revenue_Prediction_DP.pptx
+++ b/Google_Revenue_Prediction_DP.pptx
@@ -4226,9 +4226,10 @@
           <a:lstStyle/>
           <a:p>
             <a:r>
-              <a:rPr lang="en-US" dirty="0"/>
+              <a:rPr lang="en-US"/>
               <a:t>Exploratory Data Analysis</a:t>
             </a:r>
+            <a:endParaRPr lang="en-US" dirty="0"/>
           </a:p>
         </p:txBody>
       </p:sp>
@@ -4677,8 +4678,8 @@
         </p:blipFill>
         <p:spPr>
           <a:xfrm>
-            <a:off x="6369366" y="3716649"/>
-            <a:ext cx="1741359" cy="1079642"/>
+            <a:off x="6225961" y="3486456"/>
+            <a:ext cx="2112638" cy="1309835"/>
           </a:xfrm>
           <a:prstGeom prst="rect">
             <a:avLst/>
@@ -5226,8 +5227,8 @@
         </p:blipFill>
         <p:spPr>
           <a:xfrm>
-            <a:off x="9582150" y="5063107"/>
-            <a:ext cx="2407535" cy="1414426"/>
+            <a:off x="9401176" y="4956784"/>
+            <a:ext cx="2588510" cy="1520749"/>
           </a:xfrm>
           <a:prstGeom prst="rect">
             <a:avLst/>
@@ -5513,6 +5514,14 @@
 <file path=ppt/slides/slide5.xml><?xml version="1.0" encoding="utf-8"?>
 <p:sld xmlns:a="http://schemas.openxmlformats.org/drawingml/2006/main" xmlns:r="http://schemas.openxmlformats.org/officeDocument/2006/relationships" xmlns:p="http://schemas.openxmlformats.org/presentationml/2006/main">
   <p:cSld>
+    <p:bg>
+      <p:bgPr>
+        <a:solidFill>
+          <a:schemeClr val="bg1"/>
+        </a:solidFill>
+        <a:effectLst/>
+      </p:bgPr>
+    </p:bg>
     <p:spTree>
       <p:nvGrpSpPr>
         <p:cNvPr id="1" name=""/>
@@ -5529,24 +5538,116 @@
       </p:grpSpPr>
       <p:sp>
         <p:nvSpPr>
-          <p:cNvPr id="2" name="Title 1">
-            <a:extLst>
-              <a:ext uri="{FF2B5EF4-FFF2-40B4-BE49-F238E27FC236}">
-                <a16:creationId xmlns:a16="http://schemas.microsoft.com/office/drawing/2014/main" id="{E7482878-60EE-7540-B0F6-13AE0B5A338F}"/>
-              </a:ext>
-            </a:extLst>
-          </p:cNvPr>
-          <p:cNvSpPr>
-            <a:spLocks noGrp="1"/>
-          </p:cNvSpPr>
-          <p:nvPr>
-            <p:ph type="title"/>
+          <p:cNvPr id="21" name="Rectangle 20">
+            <a:extLst>
+              <a:ext uri="{FF2B5EF4-FFF2-40B4-BE49-F238E27FC236}">
+                <a16:creationId xmlns:a16="http://schemas.microsoft.com/office/drawing/2014/main" id="{6166C6D1-23AC-49C4-BA07-238E4E9F8CEB}"/>
+              </a:ext>
+              <a:ext uri="{C183D7F6-B498-43B3-948B-1728B52AA6E4}">
+                <adec:decorative xmlns:adec="http://schemas.microsoft.com/office/drawing/2017/decorative" val="1"/>
+              </a:ext>
+            </a:extLst>
+          </p:cNvPr>
+          <p:cNvSpPr>
+            <a:spLocks noGrp="1" noRot="1" noChangeAspect="1" noMove="1" noResize="1" noEditPoints="1" noAdjustHandles="1" noChangeArrowheads="1" noChangeShapeType="1" noTextEdit="1"/>
+          </p:cNvSpPr>
+          <p:nvPr>
+            <p:extLst>
+              <p:ext uri="{386F3935-93C4-4BCD-93E2-E3B085C9AB24}">
+                <p16:designElem xmlns:p16="http://schemas.microsoft.com/office/powerpoint/2015/main" val="1"/>
+              </p:ext>
+            </p:extLst>
           </p:nvPr>
         </p:nvSpPr>
         <p:spPr>
           <a:xfrm>
-            <a:off x="838200" y="963877"/>
-            <a:ext cx="3494362" cy="4930246"/>
+            <a:off x="462058" y="450221"/>
+            <a:ext cx="4402377" cy="3918123"/>
+          </a:xfrm>
+          <a:prstGeom prst="rect">
+            <a:avLst/>
+          </a:prstGeom>
+          <a:solidFill>
+            <a:srgbClr val="595959"/>
+          </a:solidFill>
+          <a:ln w="25400">
+            <a:noFill/>
+          </a:ln>
+        </p:spPr>
+        <p:style>
+          <a:lnRef idx="2">
+            <a:schemeClr val="accent1">
+              <a:shade val="50000"/>
+            </a:schemeClr>
+          </a:lnRef>
+          <a:fillRef idx="1">
+            <a:schemeClr val="accent1"/>
+          </a:fillRef>
+          <a:effectRef idx="0">
+            <a:schemeClr val="accent1"/>
+          </a:effectRef>
+          <a:fontRef idx="minor">
+            <a:schemeClr val="lt1"/>
+          </a:fontRef>
+        </p:style>
+        <p:txBody>
+          <a:bodyPr rtlCol="0" anchor="ctr"/>
+          <a:lstStyle/>
+          <a:p>
+            <a:pPr marL="0" marR="0" lvl="0" indent="0" algn="ctr" defTabSz="914400" rtl="0" eaLnBrk="1" fontAlgn="auto" latinLnBrk="0" hangingPunct="1">
+              <a:lnSpc>
+                <a:spcPct val="100000"/>
+              </a:lnSpc>
+              <a:spcBef>
+                <a:spcPts val="0"/>
+              </a:spcBef>
+              <a:spcAft>
+                <a:spcPts val="0"/>
+              </a:spcAft>
+              <a:buClrTx/>
+              <a:buSzTx/>
+              <a:buFontTx/>
+              <a:buNone/>
+              <a:tabLst/>
+              <a:defRPr/>
+            </a:pPr>
+            <a:endParaRPr kumimoji="0" lang="en-US" sz="1800" b="0" i="0" u="none" strike="noStrike" kern="1200" cap="none" spc="0" normalizeH="0" baseline="0" noProof="0">
+              <a:ln>
+                <a:noFill/>
+              </a:ln>
+              <a:solidFill>
+                <a:srgbClr val="FFFFFF"/>
+              </a:solidFill>
+              <a:effectLst/>
+              <a:uLnTx/>
+              <a:uFillTx/>
+              <a:latin typeface="Calibri" panose="020F0502020204030204"/>
+              <a:ea typeface="+mn-ea"/>
+              <a:cs typeface="+mn-cs"/>
+            </a:endParaRPr>
+          </a:p>
+        </p:txBody>
+      </p:sp>
+      <p:sp>
+        <p:nvSpPr>
+          <p:cNvPr id="2" name="Title 1">
+            <a:extLst>
+              <a:ext uri="{FF2B5EF4-FFF2-40B4-BE49-F238E27FC236}">
+                <a16:creationId xmlns:a16="http://schemas.microsoft.com/office/drawing/2014/main" id="{E7482878-60EE-7540-B0F6-13AE0B5A338F}"/>
+              </a:ext>
+            </a:extLst>
+          </p:cNvPr>
+          <p:cNvSpPr>
+            <a:spLocks noGrp="1"/>
+          </p:cNvSpPr>
+          <p:nvPr>
+            <p:ph type="title"/>
+          </p:nvPr>
+        </p:nvSpPr>
+        <p:spPr>
+          <a:xfrm>
+            <a:off x="788466" y="780655"/>
+            <a:ext cx="3751662" cy="3261168"/>
           </a:xfrm>
         </p:spPr>
         <p:txBody>
@@ -5555,46 +5656,349 @@
           </a:bodyPr>
           <a:lstStyle/>
           <a:p>
-            <a:pPr algn="r"/>
-            <a:r>
-              <a:rPr lang="en-US" dirty="0" err="1">
+            <a:r>
+              <a:rPr lang="en-US">
                 <a:solidFill>
-                  <a:schemeClr val="accent1"/>
+                  <a:srgbClr val="FFFFFF"/>
                 </a:solidFill>
               </a:rPr>
-              <a:t>XGBoost</a:t>
-            </a:r>
-            <a:r>
-              <a:rPr lang="en-US" dirty="0">
-                <a:solidFill>
-                  <a:schemeClr val="accent1"/>
-                </a:solidFill>
-              </a:rPr>
-              <a:t> </a:t>
-            </a:r>
-          </a:p>
-        </p:txBody>
-      </p:sp>
-      <p:sp>
-        <p:nvSpPr>
-          <p:cNvPr id="3" name="Content Placeholder 2">
-            <a:extLst>
-              <a:ext uri="{FF2B5EF4-FFF2-40B4-BE49-F238E27FC236}">
-                <a16:creationId xmlns:a16="http://schemas.microsoft.com/office/drawing/2014/main" id="{C00B7144-CE84-5E4A-8530-EFF6A89A3DBC}"/>
-              </a:ext>
-            </a:extLst>
-          </p:cNvPr>
-          <p:cNvSpPr>
-            <a:spLocks noGrp="1"/>
-          </p:cNvSpPr>
-          <p:nvPr>
-            <p:ph idx="1"/>
+              <a:t>XGBoost </a:t>
+            </a:r>
+          </a:p>
+        </p:txBody>
+      </p:sp>
+      <p:sp>
+        <p:nvSpPr>
+          <p:cNvPr id="23" name="Rectangle 22">
+            <a:extLst>
+              <a:ext uri="{FF2B5EF4-FFF2-40B4-BE49-F238E27FC236}">
+                <a16:creationId xmlns:a16="http://schemas.microsoft.com/office/drawing/2014/main" id="{B775CD93-9DF2-48CB-9F57-1BCA9A46C7FA}"/>
+              </a:ext>
+              <a:ext uri="{C183D7F6-B498-43B3-948B-1728B52AA6E4}">
+                <adec:decorative xmlns:adec="http://schemas.microsoft.com/office/drawing/2017/decorative" val="1"/>
+              </a:ext>
+            </a:extLst>
+          </p:cNvPr>
+          <p:cNvSpPr>
+            <a:spLocks noGrp="1" noRot="1" noChangeAspect="1" noMove="1" noResize="1" noEditPoints="1" noAdjustHandles="1" noChangeArrowheads="1" noChangeShapeType="1" noTextEdit="1"/>
+          </p:cNvSpPr>
+          <p:nvPr>
+            <p:extLst>
+              <p:ext uri="{386F3935-93C4-4BCD-93E2-E3B085C9AB24}">
+                <p16:designElem xmlns:p16="http://schemas.microsoft.com/office/powerpoint/2015/main" val="1"/>
+              </p:ext>
+            </p:extLst>
           </p:nvPr>
         </p:nvSpPr>
         <p:spPr>
           <a:xfrm>
-            <a:off x="4976031" y="963877"/>
-            <a:ext cx="6377769" cy="4930246"/>
+            <a:off x="5018376" y="458922"/>
+            <a:ext cx="2138070" cy="1877811"/>
+          </a:xfrm>
+          <a:prstGeom prst="rect">
+            <a:avLst/>
+          </a:prstGeom>
+          <a:solidFill>
+            <a:schemeClr val="accent1"/>
+          </a:solidFill>
+          <a:ln w="25400">
+            <a:noFill/>
+          </a:ln>
+        </p:spPr>
+        <p:style>
+          <a:lnRef idx="2">
+            <a:schemeClr val="accent1">
+              <a:shade val="50000"/>
+            </a:schemeClr>
+          </a:lnRef>
+          <a:fillRef idx="1">
+            <a:schemeClr val="accent1"/>
+          </a:fillRef>
+          <a:effectRef idx="0">
+            <a:schemeClr val="accent1"/>
+          </a:effectRef>
+          <a:fontRef idx="minor">
+            <a:schemeClr val="lt1"/>
+          </a:fontRef>
+        </p:style>
+        <p:txBody>
+          <a:bodyPr rtlCol="0" anchor="ctr"/>
+          <a:lstStyle/>
+          <a:p>
+            <a:pPr marL="0" marR="0" lvl="0" indent="0" algn="ctr" defTabSz="914400" rtl="0" eaLnBrk="1" fontAlgn="auto" latinLnBrk="0" hangingPunct="1">
+              <a:lnSpc>
+                <a:spcPct val="100000"/>
+              </a:lnSpc>
+              <a:spcBef>
+                <a:spcPts val="0"/>
+              </a:spcBef>
+              <a:spcAft>
+                <a:spcPts val="0"/>
+              </a:spcAft>
+              <a:buClrTx/>
+              <a:buSzTx/>
+              <a:buFontTx/>
+              <a:buNone/>
+              <a:tabLst/>
+              <a:defRPr/>
+            </a:pPr>
+            <a:endParaRPr kumimoji="0" lang="en-US" sz="1800" b="0" i="0" u="none" strike="noStrike" kern="1200" cap="none" spc="0" normalizeH="0" baseline="0" noProof="0">
+              <a:ln>
+                <a:noFill/>
+              </a:ln>
+              <a:solidFill>
+                <a:srgbClr val="FFFFFF"/>
+              </a:solidFill>
+              <a:effectLst/>
+              <a:uLnTx/>
+              <a:uFillTx/>
+              <a:latin typeface="Calibri" panose="020F0502020204030204"/>
+              <a:ea typeface="+mn-ea"/>
+              <a:cs typeface="+mn-cs"/>
+            </a:endParaRPr>
+          </a:p>
+        </p:txBody>
+      </p:sp>
+      <p:sp>
+        <p:nvSpPr>
+          <p:cNvPr id="25" name="Rectangle 24">
+            <a:extLst>
+              <a:ext uri="{FF2B5EF4-FFF2-40B4-BE49-F238E27FC236}">
+                <a16:creationId xmlns:a16="http://schemas.microsoft.com/office/drawing/2014/main" id="{E186B68C-84BC-4A6E-99D1-EE87483C1349}"/>
+              </a:ext>
+              <a:ext uri="{C183D7F6-B498-43B3-948B-1728B52AA6E4}">
+                <adec:decorative xmlns:adec="http://schemas.microsoft.com/office/drawing/2017/decorative" val="1"/>
+              </a:ext>
+            </a:extLst>
+          </p:cNvPr>
+          <p:cNvSpPr>
+            <a:spLocks noGrp="1" noRot="1" noChangeAspect="1" noMove="1" noResize="1" noEditPoints="1" noAdjustHandles="1" noChangeArrowheads="1" noChangeShapeType="1" noTextEdit="1"/>
+          </p:cNvSpPr>
+          <p:nvPr>
+            <p:extLst>
+              <p:ext uri="{386F3935-93C4-4BCD-93E2-E3B085C9AB24}">
+                <p16:designElem xmlns:p16="http://schemas.microsoft.com/office/powerpoint/2015/main" val="1"/>
+              </p:ext>
+            </p:extLst>
+          </p:nvPr>
+        </p:nvSpPr>
+        <p:spPr>
+          <a:xfrm>
+            <a:off x="5018377" y="2469002"/>
+            <a:ext cx="2146028" cy="1898903"/>
+          </a:xfrm>
+          <a:prstGeom prst="rect">
+            <a:avLst/>
+          </a:prstGeom>
+          <a:solidFill>
+            <a:srgbClr val="4A58DF"/>
+          </a:solidFill>
+          <a:ln w="25400">
+            <a:noFill/>
+          </a:ln>
+        </p:spPr>
+        <p:style>
+          <a:lnRef idx="2">
+            <a:schemeClr val="accent1">
+              <a:shade val="50000"/>
+            </a:schemeClr>
+          </a:lnRef>
+          <a:fillRef idx="1">
+            <a:schemeClr val="accent1"/>
+          </a:fillRef>
+          <a:effectRef idx="0">
+            <a:schemeClr val="accent1"/>
+          </a:effectRef>
+          <a:fontRef idx="minor">
+            <a:schemeClr val="lt1"/>
+          </a:fontRef>
+        </p:style>
+        <p:txBody>
+          <a:bodyPr rtlCol="0" anchor="ctr"/>
+          <a:lstStyle/>
+          <a:p>
+            <a:pPr marL="0" marR="0" lvl="0" indent="0" algn="ctr" defTabSz="914400" rtl="0" eaLnBrk="1" fontAlgn="auto" latinLnBrk="0" hangingPunct="1">
+              <a:lnSpc>
+                <a:spcPct val="100000"/>
+              </a:lnSpc>
+              <a:spcBef>
+                <a:spcPts val="0"/>
+              </a:spcBef>
+              <a:spcAft>
+                <a:spcPts val="0"/>
+              </a:spcAft>
+              <a:buClrTx/>
+              <a:buSzTx/>
+              <a:buFontTx/>
+              <a:buNone/>
+              <a:tabLst/>
+              <a:defRPr/>
+            </a:pPr>
+            <a:endParaRPr kumimoji="0" lang="en-US" sz="1800" b="0" i="0" u="none" strike="noStrike" kern="1200" cap="none" spc="0" normalizeH="0" baseline="0" noProof="0">
+              <a:ln>
+                <a:noFill/>
+              </a:ln>
+              <a:solidFill>
+                <a:srgbClr val="FFFFFF"/>
+              </a:solidFill>
+              <a:effectLst/>
+              <a:uLnTx/>
+              <a:uFillTx/>
+              <a:latin typeface="Calibri" panose="020F0502020204030204"/>
+              <a:ea typeface="+mn-ea"/>
+              <a:cs typeface="+mn-cs"/>
+            </a:endParaRPr>
+          </a:p>
+        </p:txBody>
+      </p:sp>
+      <p:pic>
+        <p:nvPicPr>
+          <p:cNvPr id="5" name="Picture 4" descr="A screenshot of a cell phone&#10;&#10;Description automatically generated">
+            <a:extLst>
+              <a:ext uri="{FF2B5EF4-FFF2-40B4-BE49-F238E27FC236}">
+                <a16:creationId xmlns:a16="http://schemas.microsoft.com/office/drawing/2014/main" id="{17BBA554-A46F-5649-89DD-BCF60795C06C}"/>
+              </a:ext>
+            </a:extLst>
+          </p:cNvPr>
+          <p:cNvPicPr>
+            <a:picLocks noChangeAspect="1"/>
+          </p:cNvPicPr>
+          <p:nvPr/>
+        </p:nvPicPr>
+        <p:blipFill>
+          <a:blip r:embed="rId2"/>
+          <a:stretch>
+            <a:fillRect/>
+          </a:stretch>
+        </p:blipFill>
+        <p:spPr>
+          <a:xfrm>
+            <a:off x="458920" y="5072003"/>
+            <a:ext cx="6709432" cy="876855"/>
+          </a:xfrm>
+          <a:prstGeom prst="rect">
+            <a:avLst/>
+          </a:prstGeom>
+        </p:spPr>
+      </p:pic>
+      <p:sp>
+        <p:nvSpPr>
+          <p:cNvPr id="27" name="Rectangle 26">
+            <a:extLst>
+              <a:ext uri="{FF2B5EF4-FFF2-40B4-BE49-F238E27FC236}">
+                <a16:creationId xmlns:a16="http://schemas.microsoft.com/office/drawing/2014/main" id="{1C091803-41C2-48E0-9228-5148460C7479}"/>
+              </a:ext>
+              <a:ext uri="{C183D7F6-B498-43B3-948B-1728B52AA6E4}">
+                <adec:decorative xmlns:adec="http://schemas.microsoft.com/office/drawing/2017/decorative" val="1"/>
+              </a:ext>
+            </a:extLst>
+          </p:cNvPr>
+          <p:cNvSpPr>
+            <a:spLocks noGrp="1" noRot="1" noChangeAspect="1" noMove="1" noResize="1" noEditPoints="1" noAdjustHandles="1" noChangeArrowheads="1" noChangeShapeType="1" noTextEdit="1"/>
+          </p:cNvSpPr>
+          <p:nvPr>
+            <p:extLst>
+              <p:ext uri="{386F3935-93C4-4BCD-93E2-E3B085C9AB24}">
+                <p16:designElem xmlns:p16="http://schemas.microsoft.com/office/powerpoint/2015/main" val="1"/>
+              </p:ext>
+            </p:extLst>
+          </p:nvPr>
+        </p:nvSpPr>
+        <p:spPr>
+          <a:xfrm>
+            <a:off x="7311418" y="450221"/>
+            <a:ext cx="4421661" cy="5948858"/>
+          </a:xfrm>
+          <a:prstGeom prst="rect">
+            <a:avLst/>
+          </a:prstGeom>
+          <a:solidFill>
+            <a:schemeClr val="tx1">
+              <a:lumMod val="50000"/>
+              <a:lumOff val="50000"/>
+              <a:alpha val="20000"/>
+            </a:schemeClr>
+          </a:solidFill>
+          <a:ln>
+            <a:noFill/>
+          </a:ln>
+        </p:spPr>
+        <p:style>
+          <a:lnRef idx="2">
+            <a:schemeClr val="accent1">
+              <a:shade val="50000"/>
+            </a:schemeClr>
+          </a:lnRef>
+          <a:fillRef idx="1">
+            <a:schemeClr val="accent1"/>
+          </a:fillRef>
+          <a:effectRef idx="0">
+            <a:schemeClr val="accent1"/>
+          </a:effectRef>
+          <a:fontRef idx="minor">
+            <a:schemeClr val="lt1"/>
+          </a:fontRef>
+        </p:style>
+        <p:txBody>
+          <a:bodyPr rtlCol="0" anchor="ctr"/>
+          <a:lstStyle/>
+          <a:p>
+            <a:pPr marL="0" marR="0" lvl="0" indent="0" algn="ctr" defTabSz="914400" rtl="0" eaLnBrk="1" fontAlgn="auto" latinLnBrk="0" hangingPunct="1">
+              <a:lnSpc>
+                <a:spcPct val="100000"/>
+              </a:lnSpc>
+              <a:spcBef>
+                <a:spcPts val="0"/>
+              </a:spcBef>
+              <a:spcAft>
+                <a:spcPts val="0"/>
+              </a:spcAft>
+              <a:buClrTx/>
+              <a:buSzTx/>
+              <a:buFontTx/>
+              <a:buNone/>
+              <a:tabLst/>
+              <a:defRPr/>
+            </a:pPr>
+            <a:endParaRPr kumimoji="0" lang="en-US" sz="1800" b="0" i="0" u="none" strike="noStrike" kern="1200" cap="none" spc="0" normalizeH="0" baseline="0" noProof="0">
+              <a:ln>
+                <a:noFill/>
+              </a:ln>
+              <a:solidFill>
+                <a:prstClr val="white">
+                  <a:lumMod val="85000"/>
+                </a:prstClr>
+              </a:solidFill>
+              <a:effectLst/>
+              <a:uLnTx/>
+              <a:uFillTx/>
+              <a:latin typeface="Calibri" panose="020F0502020204030204"/>
+              <a:ea typeface="+mn-ea"/>
+              <a:cs typeface="+mn-cs"/>
+            </a:endParaRPr>
+          </a:p>
+        </p:txBody>
+      </p:sp>
+      <p:sp>
+        <p:nvSpPr>
+          <p:cNvPr id="3" name="Content Placeholder 2">
+            <a:extLst>
+              <a:ext uri="{FF2B5EF4-FFF2-40B4-BE49-F238E27FC236}">
+                <a16:creationId xmlns:a16="http://schemas.microsoft.com/office/drawing/2014/main" id="{C00B7144-CE84-5E4A-8530-EFF6A89A3DBC}"/>
+              </a:ext>
+            </a:extLst>
+          </p:cNvPr>
+          <p:cNvSpPr>
+            <a:spLocks noGrp="1"/>
+          </p:cNvSpPr>
+          <p:nvPr>
+            <p:ph idx="1"/>
+          </p:nvPr>
+        </p:nvSpPr>
+        <p:spPr>
+          <a:xfrm>
+            <a:off x="7761639" y="900442"/>
+            <a:ext cx="3514088" cy="5048417"/>
           </a:xfrm>
         </p:spPr>
         <p:txBody>
@@ -5611,7 +6015,7 @@
           <a:p>
             <a:pPr lvl="1"/>
             <a:r>
-              <a:rPr lang="en-US" sz="2000" dirty="0"/>
+              <a:rPr lang="en-US" dirty="0"/>
               <a:t>Robust to non-normality </a:t>
             </a:r>
           </a:p>
@@ -5624,7 +6028,7 @@
           <a:p>
             <a:pPr lvl="1"/>
             <a:r>
-              <a:rPr lang="en-US" sz="2000" dirty="0"/>
+              <a:rPr lang="en-US" dirty="0"/>
               <a:t>One-hot encoding </a:t>
             </a:r>
           </a:p>
@@ -5638,14 +6042,22 @@
             <a:pPr lvl="1"/>
             <a:r>
               <a:rPr lang="en-US" sz="2000" dirty="0"/>
-              <a:t>Interpretation</a:t>
+              <a:t>Library(</a:t>
+            </a:r>
+            <a:r>
+              <a:rPr lang="en-US" sz="2000" dirty="0" err="1"/>
+              <a:t>xgboost</a:t>
+            </a:r>
+            <a:r>
+              <a:rPr lang="en-US" sz="2000" dirty="0"/>
+              <a:t>)</a:t>
             </a:r>
           </a:p>
           <a:p>
             <a:pPr marL="457200" lvl="1" indent="0">
               <a:buNone/>
             </a:pPr>
-            <a:endParaRPr lang="en-US" sz="2000" dirty="0"/>
+            <a:endParaRPr lang="en-US" dirty="0"/>
           </a:p>
         </p:txBody>
       </p:sp>
@@ -5665,6 +6077,14 @@
 <file path=ppt/slides/slide6.xml><?xml version="1.0" encoding="utf-8"?>
 <p:sld xmlns:a="http://schemas.openxmlformats.org/drawingml/2006/main" xmlns:r="http://schemas.openxmlformats.org/officeDocument/2006/relationships" xmlns:p="http://schemas.openxmlformats.org/presentationml/2006/main">
   <p:cSld>
+    <p:bg>
+      <p:bgPr>
+        <a:solidFill>
+          <a:schemeClr val="bg1"/>
+        </a:solidFill>
+        <a:effectLst/>
+      </p:bgPr>
+    </p:bg>
     <p:spTree>
       <p:nvGrpSpPr>
         <p:cNvPr id="1" name=""/>
@@ -5679,6 +6099,123 @@
           <a:chExt cx="0" cy="0"/>
         </a:xfrm>
       </p:grpSpPr>
+      <p:cxnSp>
+        <p:nvCxnSpPr>
+          <p:cNvPr id="13" name="Straight Connector 12">
+            <a:extLst>
+              <a:ext uri="{FF2B5EF4-FFF2-40B4-BE49-F238E27FC236}">
+                <a16:creationId xmlns:a16="http://schemas.microsoft.com/office/drawing/2014/main" id="{DB146403-F3D6-484B-B2ED-97F9565D0370}"/>
+              </a:ext>
+              <a:ext uri="{C183D7F6-B498-43B3-948B-1728B52AA6E4}">
+                <adec:decorative xmlns:adec="http://schemas.microsoft.com/office/drawing/2017/decorative" val="1"/>
+              </a:ext>
+            </a:extLst>
+          </p:cNvPr>
+          <p:cNvCxnSpPr>
+            <a:cxnSpLocks noGrp="1" noRot="1" noChangeAspect="1" noMove="1" noResize="1" noEditPoints="1" noAdjustHandles="1" noChangeArrowheads="1" noChangeShapeType="1"/>
+          </p:cNvCxnSpPr>
+          <p:nvPr>
+            <p:extLst>
+              <p:ext uri="{386F3935-93C4-4BCD-93E2-E3B085C9AB24}">
+                <p16:designElem xmlns:p16="http://schemas.microsoft.com/office/powerpoint/2015/main" val="1"/>
+              </p:ext>
+            </p:extLst>
+          </p:nvPr>
+        </p:nvCxnSpPr>
+        <p:spPr>
+          <a:xfrm>
+            <a:off x="6096000" y="477749"/>
+            <a:ext cx="0" cy="3657600"/>
+          </a:xfrm>
+          <a:prstGeom prst="line">
+            <a:avLst/>
+          </a:prstGeom>
+          <a:ln w="101600" cmpd="dbl">
+            <a:solidFill>
+              <a:srgbClr val="595959"/>
+            </a:solidFill>
+          </a:ln>
+        </p:spPr>
+        <p:style>
+          <a:lnRef idx="1">
+            <a:schemeClr val="accent1"/>
+          </a:lnRef>
+          <a:fillRef idx="0">
+            <a:schemeClr val="accent1"/>
+          </a:fillRef>
+          <a:effectRef idx="0">
+            <a:schemeClr val="accent1"/>
+          </a:effectRef>
+          <a:fontRef idx="minor">
+            <a:schemeClr val="tx1"/>
+          </a:fontRef>
+        </p:style>
+      </p:cxnSp>
+      <p:sp>
+        <p:nvSpPr>
+          <p:cNvPr id="15" name="Rectangle 14">
+            <a:extLst>
+              <a:ext uri="{FF2B5EF4-FFF2-40B4-BE49-F238E27FC236}">
+                <a16:creationId xmlns:a16="http://schemas.microsoft.com/office/drawing/2014/main" id="{823AC064-BC96-4F32-8AE1-B2FD38754823}"/>
+              </a:ext>
+              <a:ext uri="{C183D7F6-B498-43B3-948B-1728B52AA6E4}">
+                <adec:decorative xmlns:adec="http://schemas.microsoft.com/office/drawing/2017/decorative" val="1"/>
+              </a:ext>
+            </a:extLst>
+          </p:cNvPr>
+          <p:cNvSpPr>
+            <a:spLocks noGrp="1" noRot="1" noChangeAspect="1" noMove="1" noResize="1" noEditPoints="1" noAdjustHandles="1" noChangeArrowheads="1" noChangeShapeType="1" noTextEdit="1"/>
+          </p:cNvSpPr>
+          <p:nvPr>
+            <p:extLst>
+              <p:ext uri="{386F3935-93C4-4BCD-93E2-E3B085C9AB24}">
+                <p16:designElem xmlns:p16="http://schemas.microsoft.com/office/powerpoint/2015/main" val="1"/>
+              </p:ext>
+            </p:extLst>
+          </p:nvPr>
+        </p:nvSpPr>
+        <p:spPr bwMode="ltGray">
+          <a:xfrm>
+            <a:off x="378068" y="4633546"/>
+            <a:ext cx="11438793" cy="1844256"/>
+          </a:xfrm>
+          <a:prstGeom prst="rect">
+            <a:avLst/>
+          </a:prstGeom>
+          <a:solidFill>
+            <a:srgbClr val="404040"/>
+          </a:solidFill>
+          <a:ln w="127000" cap="sq" cmpd="thinThick">
+            <a:solidFill>
+              <a:srgbClr val="404040"/>
+            </a:solidFill>
+          </a:ln>
+        </p:spPr>
+        <p:style>
+          <a:lnRef idx="2">
+            <a:schemeClr val="accent1">
+              <a:shade val="50000"/>
+            </a:schemeClr>
+          </a:lnRef>
+          <a:fillRef idx="1">
+            <a:schemeClr val="accent1"/>
+          </a:fillRef>
+          <a:effectRef idx="0">
+            <a:schemeClr val="accent1"/>
+          </a:effectRef>
+          <a:fontRef idx="minor">
+            <a:schemeClr val="lt1"/>
+          </a:fontRef>
+        </p:style>
+        <p:txBody>
+          <a:bodyPr rtlCol="0" anchor="ctr"/>
+          <a:lstStyle/>
+          <a:p>
+            <a:pPr algn="ctr"/>
+            <a:endParaRPr lang="en-US"/>
+          </a:p>
+        </p:txBody>
+      </p:sp>
       <p:sp>
         <p:nvSpPr>
           <p:cNvPr id="2" name="Title 1">
@@ -5695,51 +6232,144 @@
             <p:ph type="title"/>
           </p:nvPr>
         </p:nvSpPr>
-        <p:spPr/>
-        <p:txBody>
-          <a:bodyPr/>
-          <a:lstStyle/>
-          <a:p>
-            <a:r>
-              <a:rPr lang="en-US" dirty="0"/>
-              <a:t>Visuals from </a:t>
-            </a:r>
-            <a:r>
-              <a:rPr lang="en-US" dirty="0" err="1"/>
-              <a:t>XGBoost</a:t>
-            </a:r>
-            <a:r>
-              <a:rPr lang="en-US" dirty="0"/>
-              <a:t> </a:t>
-            </a:r>
-          </a:p>
-        </p:txBody>
-      </p:sp>
-      <p:sp>
-        <p:nvSpPr>
-          <p:cNvPr id="3" name="Content Placeholder 2">
-            <a:extLst>
-              <a:ext uri="{FF2B5EF4-FFF2-40B4-BE49-F238E27FC236}">
-                <a16:creationId xmlns:a16="http://schemas.microsoft.com/office/drawing/2014/main" id="{841BD60C-56C5-BD44-B884-C9C8ADC249EA}"/>
-              </a:ext>
-            </a:extLst>
-          </p:cNvPr>
-          <p:cNvSpPr>
-            <a:spLocks noGrp="1"/>
-          </p:cNvSpPr>
+        <p:spPr>
+          <a:xfrm>
+            <a:off x="527538" y="4756638"/>
+            <a:ext cx="11139854" cy="930447"/>
+          </a:xfrm>
+        </p:spPr>
+        <p:txBody>
+          <a:bodyPr vert="horz" lIns="91440" tIns="45720" rIns="91440" bIns="45720" rtlCol="0" anchor="b">
+            <a:normAutofit/>
+          </a:bodyPr>
+          <a:lstStyle/>
+          <a:p>
+            <a:pPr algn="ctr"/>
+            <a:r>
+              <a:rPr lang="en-US" sz="3400">
+                <a:solidFill>
+                  <a:srgbClr val="FFFFFF"/>
+                </a:solidFill>
+              </a:rPr>
+              <a:t>Effect of Max Depth Parameter on Training and Validation Error </a:t>
+            </a:r>
+          </a:p>
+        </p:txBody>
+      </p:sp>
+      <p:pic>
+        <p:nvPicPr>
+          <p:cNvPr id="5" name="Content Placeholder 4">
+            <a:extLst>
+              <a:ext uri="{FF2B5EF4-FFF2-40B4-BE49-F238E27FC236}">
+                <a16:creationId xmlns:a16="http://schemas.microsoft.com/office/drawing/2014/main" id="{9212E9F7-002A-644E-9C9C-31807171BCF8}"/>
+              </a:ext>
+            </a:extLst>
+          </p:cNvPr>
+          <p:cNvPicPr>
+            <a:picLocks noGrp="1" noChangeAspect="1"/>
+          </p:cNvPicPr>
           <p:nvPr>
             <p:ph idx="1"/>
           </p:nvPr>
-        </p:nvSpPr>
-        <p:spPr/>
-        <p:txBody>
-          <a:bodyPr/>
-          <a:lstStyle/>
-          <a:p>
-            <a:endParaRPr lang="en-US"/>
-          </a:p>
-        </p:txBody>
-      </p:sp>
+        </p:nvPicPr>
+        <p:blipFill>
+          <a:blip r:embed="rId2"/>
+          <a:stretch>
+            <a:fillRect/>
+          </a:stretch>
+        </p:blipFill>
+        <p:spPr>
+          <a:xfrm>
+            <a:off x="320040" y="608395"/>
+            <a:ext cx="5455917" cy="3396308"/>
+          </a:xfrm>
+          <a:prstGeom prst="rect">
+            <a:avLst/>
+          </a:prstGeom>
+        </p:spPr>
+      </p:pic>
+      <p:pic>
+        <p:nvPicPr>
+          <p:cNvPr id="8" name="Picture 7" descr="A close up of a map&#10;&#10;Description automatically generated">
+            <a:extLst>
+              <a:ext uri="{FF2B5EF4-FFF2-40B4-BE49-F238E27FC236}">
+                <a16:creationId xmlns:a16="http://schemas.microsoft.com/office/drawing/2014/main" id="{EE9DCDE6-BC58-D444-B0EC-2C8BDB26C547}"/>
+              </a:ext>
+            </a:extLst>
+          </p:cNvPr>
+          <p:cNvPicPr>
+            <a:picLocks noChangeAspect="1"/>
+          </p:cNvPicPr>
+          <p:nvPr/>
+        </p:nvPicPr>
+        <p:blipFill>
+          <a:blip r:embed="rId3"/>
+          <a:stretch>
+            <a:fillRect/>
+          </a:stretch>
+        </p:blipFill>
+        <p:spPr>
+          <a:xfrm>
+            <a:off x="6416043" y="642495"/>
+            <a:ext cx="5455917" cy="3328109"/>
+          </a:xfrm>
+          <a:prstGeom prst="rect">
+            <a:avLst/>
+          </a:prstGeom>
+        </p:spPr>
+      </p:pic>
+      <p:cxnSp>
+        <p:nvCxnSpPr>
+          <p:cNvPr id="17" name="Straight Connector 16">
+            <a:extLst>
+              <a:ext uri="{FF2B5EF4-FFF2-40B4-BE49-F238E27FC236}">
+                <a16:creationId xmlns:a16="http://schemas.microsoft.com/office/drawing/2014/main" id="{7E7C77BC-7138-40B1-A15B-20F57A494629}"/>
+              </a:ext>
+              <a:ext uri="{C183D7F6-B498-43B3-948B-1728B52AA6E4}">
+                <adec:decorative xmlns:adec="http://schemas.microsoft.com/office/drawing/2017/decorative" val="1"/>
+              </a:ext>
+            </a:extLst>
+          </p:cNvPr>
+          <p:cNvCxnSpPr>
+            <a:cxnSpLocks noGrp="1" noRot="1" noChangeAspect="1" noMove="1" noResize="1" noEditPoints="1" noAdjustHandles="1" noChangeArrowheads="1" noChangeShapeType="1"/>
+          </p:cNvCxnSpPr>
+          <p:nvPr>
+            <p:extLst>
+              <p:ext uri="{386F3935-93C4-4BCD-93E2-E3B085C9AB24}">
+                <p16:designElem xmlns:p16="http://schemas.microsoft.com/office/powerpoint/2015/main" val="1"/>
+              </p:ext>
+            </p:extLst>
+          </p:nvPr>
+        </p:nvCxnSpPr>
+        <p:spPr>
+          <a:xfrm>
+            <a:off x="2209800" y="5738691"/>
+            <a:ext cx="7772400" cy="0"/>
+          </a:xfrm>
+          <a:prstGeom prst="line">
+            <a:avLst/>
+          </a:prstGeom>
+          <a:ln w="22225">
+            <a:solidFill>
+              <a:srgbClr val="D9D9D9"/>
+            </a:solidFill>
+          </a:ln>
+        </p:spPr>
+        <p:style>
+          <a:lnRef idx="1">
+            <a:schemeClr val="accent1"/>
+          </a:lnRef>
+          <a:fillRef idx="0">
+            <a:schemeClr val="accent1"/>
+          </a:fillRef>
+          <a:effectRef idx="0">
+            <a:schemeClr val="accent1"/>
+          </a:effectRef>
+          <a:fontRef idx="minor">
+            <a:schemeClr val="tx1"/>
+          </a:fontRef>
+        </p:style>
+      </p:cxnSp>
     </p:spTree>
     <p:extLst>
       <p:ext uri="{BB962C8B-B14F-4D97-AF65-F5344CB8AC3E}">

</xml_diff>